<commit_message>
Add presentation given at Brainihack 2015
</commit_message>
<xml_diff>
--- a/JoyCast.pptx
+++ b/JoyCast.pptx
@@ -4,16 +4,17 @@
   <p:sldMasterIdLst>
     <p:sldMasterId id="2147483864" r:id="rId1"/>
   </p:sldMasterIdLst>
+  <p:notesMasterIdLst>
+    <p:notesMasterId r:id="rId9"/>
+  </p:notesMasterIdLst>
   <p:sldIdLst>
     <p:sldId id="256" r:id="rId2"/>
     <p:sldId id="257" r:id="rId3"/>
     <p:sldId id="267" r:id="rId4"/>
     <p:sldId id="258" r:id="rId5"/>
     <p:sldId id="265" r:id="rId6"/>
-    <p:sldId id="261" r:id="rId7"/>
-    <p:sldId id="262" r:id="rId8"/>
-    <p:sldId id="259" r:id="rId9"/>
-    <p:sldId id="266" r:id="rId10"/>
+    <p:sldId id="266" r:id="rId7"/>
+    <p:sldId id="268" r:id="rId8"/>
   </p:sldIdLst>
   <p:sldSz cx="12192000" cy="6858000"/>
   <p:notesSz cx="6858000" cy="9144000"/>
@@ -2866,11 +2867,11 @@
           <c:showBubbleSize val="0"/>
         </c:dLbls>
         <c:smooth val="0"/>
-        <c:axId val="417935792"/>
-        <c:axId val="417935400"/>
+        <c:axId val="410380496"/>
+        <c:axId val="410380888"/>
       </c:lineChart>
       <c:catAx>
-        <c:axId val="417935792"/>
+        <c:axId val="410380496"/>
         <c:scaling>
           <c:orientation val="minMax"/>
         </c:scaling>
@@ -2969,7 +2970,7 @@
             <a:endParaRPr lang="en-US"/>
           </a:p>
         </c:txPr>
-        <c:crossAx val="417935400"/>
+        <c:crossAx val="410380888"/>
         <c:crosses val="autoZero"/>
         <c:auto val="1"/>
         <c:lblAlgn val="ctr"/>
@@ -2978,7 +2979,7 @@
         <c:noMultiLvlLbl val="0"/>
       </c:catAx>
       <c:valAx>
-        <c:axId val="417935400"/>
+        <c:axId val="410380888"/>
         <c:scaling>
           <c:orientation val="minMax"/>
           <c:max val="1.1000000000000001"/>
@@ -3082,7 +3083,7 @@
             <a:endParaRPr lang="en-US"/>
           </a:p>
         </c:txPr>
-        <c:crossAx val="417935792"/>
+        <c:crossAx val="410380496"/>
         <c:crossesAt val="1"/>
         <c:crossBetween val="between"/>
       </c:valAx>
@@ -3724,6 +3725,440 @@
 </cs:chartStyle>
 </file>
 
+<file path=ppt/notesMasters/notesMaster1.xml><?xml version="1.0" encoding="utf-8"?>
+<p:notesMaster xmlns:a="http://schemas.openxmlformats.org/drawingml/2006/main" xmlns:r="http://schemas.openxmlformats.org/officeDocument/2006/relationships" xmlns:p="http://schemas.openxmlformats.org/presentationml/2006/main">
+  <p:cSld>
+    <p:bg>
+      <p:bgRef idx="1001">
+        <a:schemeClr val="bg1"/>
+      </p:bgRef>
+    </p:bg>
+    <p:spTree>
+      <p:nvGrpSpPr>
+        <p:cNvPr id="1" name=""/>
+        <p:cNvGrpSpPr/>
+        <p:nvPr/>
+      </p:nvGrpSpPr>
+      <p:grpSpPr>
+        <a:xfrm>
+          <a:off x="0" y="0"/>
+          <a:ext cx="0" cy="0"/>
+          <a:chOff x="0" y="0"/>
+          <a:chExt cx="0" cy="0"/>
+        </a:xfrm>
+      </p:grpSpPr>
+      <p:sp>
+        <p:nvSpPr>
+          <p:cNvPr id="2" name="Header Placeholder 1"/>
+          <p:cNvSpPr>
+            <a:spLocks noGrp="1"/>
+          </p:cNvSpPr>
+          <p:nvPr>
+            <p:ph type="hdr" sz="quarter"/>
+          </p:nvPr>
+        </p:nvSpPr>
+        <p:spPr>
+          <a:xfrm>
+            <a:off x="0" y="0"/>
+            <a:ext cx="2971800" cy="458788"/>
+          </a:xfrm>
+          <a:prstGeom prst="rect">
+            <a:avLst/>
+          </a:prstGeom>
+        </p:spPr>
+        <p:txBody>
+          <a:bodyPr vert="horz" lIns="91440" tIns="45720" rIns="91440" bIns="45720" rtlCol="0"/>
+          <a:lstStyle>
+            <a:lvl1pPr algn="l">
+              <a:defRPr sz="1200"/>
+            </a:lvl1pPr>
+          </a:lstStyle>
+          <a:p>
+            <a:endParaRPr lang="en-US"/>
+          </a:p>
+        </p:txBody>
+      </p:sp>
+      <p:sp>
+        <p:nvSpPr>
+          <p:cNvPr id="3" name="Date Placeholder 2"/>
+          <p:cNvSpPr>
+            <a:spLocks noGrp="1"/>
+          </p:cNvSpPr>
+          <p:nvPr>
+            <p:ph type="dt" idx="1"/>
+          </p:nvPr>
+        </p:nvSpPr>
+        <p:spPr>
+          <a:xfrm>
+            <a:off x="3884613" y="0"/>
+            <a:ext cx="2971800" cy="458788"/>
+          </a:xfrm>
+          <a:prstGeom prst="rect">
+            <a:avLst/>
+          </a:prstGeom>
+        </p:spPr>
+        <p:txBody>
+          <a:bodyPr vert="horz" lIns="91440" tIns="45720" rIns="91440" bIns="45720" rtlCol="0"/>
+          <a:lstStyle>
+            <a:lvl1pPr algn="r">
+              <a:defRPr sz="1200"/>
+            </a:lvl1pPr>
+          </a:lstStyle>
+          <a:p>
+            <a:fld id="{D85B1D4C-2C30-4C78-99CF-BA08E96887A5}" type="datetimeFigureOut">
+              <a:rPr lang="en-US" smtClean="0"/>
+              <a:t>5/3/2015</a:t>
+            </a:fld>
+            <a:endParaRPr lang="en-US"/>
+          </a:p>
+        </p:txBody>
+      </p:sp>
+      <p:sp>
+        <p:nvSpPr>
+          <p:cNvPr id="4" name="Slide Image Placeholder 3"/>
+          <p:cNvSpPr>
+            <a:spLocks noGrp="1" noRot="1" noChangeAspect="1"/>
+          </p:cNvSpPr>
+          <p:nvPr>
+            <p:ph type="sldImg" idx="2"/>
+          </p:nvPr>
+        </p:nvSpPr>
+        <p:spPr>
+          <a:xfrm>
+            <a:off x="685800" y="1143000"/>
+            <a:ext cx="5486400" cy="3086100"/>
+          </a:xfrm>
+          <a:prstGeom prst="rect">
+            <a:avLst/>
+          </a:prstGeom>
+          <a:noFill/>
+          <a:ln w="12700">
+            <a:solidFill>
+              <a:prstClr val="black"/>
+            </a:solidFill>
+          </a:ln>
+        </p:spPr>
+        <p:txBody>
+          <a:bodyPr vert="horz" lIns="91440" tIns="45720" rIns="91440" bIns="45720" rtlCol="0" anchor="ctr"/>
+          <a:lstStyle/>
+          <a:p>
+            <a:endParaRPr lang="en-US"/>
+          </a:p>
+        </p:txBody>
+      </p:sp>
+      <p:sp>
+        <p:nvSpPr>
+          <p:cNvPr id="5" name="Notes Placeholder 4"/>
+          <p:cNvSpPr>
+            <a:spLocks noGrp="1"/>
+          </p:cNvSpPr>
+          <p:nvPr>
+            <p:ph type="body" sz="quarter" idx="3"/>
+          </p:nvPr>
+        </p:nvSpPr>
+        <p:spPr>
+          <a:xfrm>
+            <a:off x="685800" y="4400550"/>
+            <a:ext cx="5486400" cy="3600450"/>
+          </a:xfrm>
+          <a:prstGeom prst="rect">
+            <a:avLst/>
+          </a:prstGeom>
+        </p:spPr>
+        <p:txBody>
+          <a:bodyPr vert="horz" lIns="91440" tIns="45720" rIns="91440" bIns="45720" rtlCol="0"/>
+          <a:lstStyle/>
+          <a:p>
+            <a:pPr lvl="0"/>
+            <a:r>
+              <a:rPr lang="en-US" smtClean="0"/>
+              <a:t>Click to edit Master text styles</a:t>
+            </a:r>
+          </a:p>
+          <a:p>
+            <a:pPr lvl="1"/>
+            <a:r>
+              <a:rPr lang="en-US" smtClean="0"/>
+              <a:t>Second level</a:t>
+            </a:r>
+          </a:p>
+          <a:p>
+            <a:pPr lvl="2"/>
+            <a:r>
+              <a:rPr lang="en-US" smtClean="0"/>
+              <a:t>Third level</a:t>
+            </a:r>
+          </a:p>
+          <a:p>
+            <a:pPr lvl="3"/>
+            <a:r>
+              <a:rPr lang="en-US" smtClean="0"/>
+              <a:t>Fourth level</a:t>
+            </a:r>
+          </a:p>
+          <a:p>
+            <a:pPr lvl="4"/>
+            <a:r>
+              <a:rPr lang="en-US" smtClean="0"/>
+              <a:t>Fifth level</a:t>
+            </a:r>
+            <a:endParaRPr lang="en-US"/>
+          </a:p>
+        </p:txBody>
+      </p:sp>
+      <p:sp>
+        <p:nvSpPr>
+          <p:cNvPr id="6" name="Footer Placeholder 5"/>
+          <p:cNvSpPr>
+            <a:spLocks noGrp="1"/>
+          </p:cNvSpPr>
+          <p:nvPr>
+            <p:ph type="ftr" sz="quarter" idx="4"/>
+          </p:nvPr>
+        </p:nvSpPr>
+        <p:spPr>
+          <a:xfrm>
+            <a:off x="0" y="8685213"/>
+            <a:ext cx="2971800" cy="458787"/>
+          </a:xfrm>
+          <a:prstGeom prst="rect">
+            <a:avLst/>
+          </a:prstGeom>
+        </p:spPr>
+        <p:txBody>
+          <a:bodyPr vert="horz" lIns="91440" tIns="45720" rIns="91440" bIns="45720" rtlCol="0" anchor="b"/>
+          <a:lstStyle>
+            <a:lvl1pPr algn="l">
+              <a:defRPr sz="1200"/>
+            </a:lvl1pPr>
+          </a:lstStyle>
+          <a:p>
+            <a:endParaRPr lang="en-US"/>
+          </a:p>
+        </p:txBody>
+      </p:sp>
+      <p:sp>
+        <p:nvSpPr>
+          <p:cNvPr id="7" name="Slide Number Placeholder 6"/>
+          <p:cNvSpPr>
+            <a:spLocks noGrp="1"/>
+          </p:cNvSpPr>
+          <p:nvPr>
+            <p:ph type="sldNum" sz="quarter" idx="5"/>
+          </p:nvPr>
+        </p:nvSpPr>
+        <p:spPr>
+          <a:xfrm>
+            <a:off x="3884613" y="8685213"/>
+            <a:ext cx="2971800" cy="458787"/>
+          </a:xfrm>
+          <a:prstGeom prst="rect">
+            <a:avLst/>
+          </a:prstGeom>
+        </p:spPr>
+        <p:txBody>
+          <a:bodyPr vert="horz" lIns="91440" tIns="45720" rIns="91440" bIns="45720" rtlCol="0" anchor="b"/>
+          <a:lstStyle>
+            <a:lvl1pPr algn="r">
+              <a:defRPr sz="1200"/>
+            </a:lvl1pPr>
+          </a:lstStyle>
+          <a:p>
+            <a:fld id="{50A2EBFE-C82A-44FE-AF36-DE5CD2501462}" type="slidenum">
+              <a:rPr lang="en-US" smtClean="0"/>
+              <a:t>‹#›</a:t>
+            </a:fld>
+            <a:endParaRPr lang="en-US"/>
+          </a:p>
+        </p:txBody>
+      </p:sp>
+    </p:spTree>
+    <p:extLst>
+      <p:ext uri="{BB962C8B-B14F-4D97-AF65-F5344CB8AC3E}">
+        <p14:creationId xmlns:p14="http://schemas.microsoft.com/office/powerpoint/2010/main" val="2155351426"/>
+      </p:ext>
+    </p:extLst>
+  </p:cSld>
+  <p:clrMap bg1="lt1" tx1="dk1" bg2="lt2" tx2="dk2" accent1="accent1" accent2="accent2" accent3="accent3" accent4="accent4" accent5="accent5" accent6="accent6" hlink="hlink" folHlink="folHlink"/>
+  <p:notesStyle>
+    <a:lvl1pPr marL="0" algn="l" defTabSz="914400" rtl="0" eaLnBrk="1" latinLnBrk="0" hangingPunct="1">
+      <a:defRPr sz="1200" kern="1200">
+        <a:solidFill>
+          <a:schemeClr val="tx1"/>
+        </a:solidFill>
+        <a:latin typeface="+mn-lt"/>
+        <a:ea typeface="+mn-ea"/>
+        <a:cs typeface="+mn-cs"/>
+      </a:defRPr>
+    </a:lvl1pPr>
+    <a:lvl2pPr marL="457200" algn="l" defTabSz="914400" rtl="0" eaLnBrk="1" latinLnBrk="0" hangingPunct="1">
+      <a:defRPr sz="1200" kern="1200">
+        <a:solidFill>
+          <a:schemeClr val="tx1"/>
+        </a:solidFill>
+        <a:latin typeface="+mn-lt"/>
+        <a:ea typeface="+mn-ea"/>
+        <a:cs typeface="+mn-cs"/>
+      </a:defRPr>
+    </a:lvl2pPr>
+    <a:lvl3pPr marL="914400" algn="l" defTabSz="914400" rtl="0" eaLnBrk="1" latinLnBrk="0" hangingPunct="1">
+      <a:defRPr sz="1200" kern="1200">
+        <a:solidFill>
+          <a:schemeClr val="tx1"/>
+        </a:solidFill>
+        <a:latin typeface="+mn-lt"/>
+        <a:ea typeface="+mn-ea"/>
+        <a:cs typeface="+mn-cs"/>
+      </a:defRPr>
+    </a:lvl3pPr>
+    <a:lvl4pPr marL="1371600" algn="l" defTabSz="914400" rtl="0" eaLnBrk="1" latinLnBrk="0" hangingPunct="1">
+      <a:defRPr sz="1200" kern="1200">
+        <a:solidFill>
+          <a:schemeClr val="tx1"/>
+        </a:solidFill>
+        <a:latin typeface="+mn-lt"/>
+        <a:ea typeface="+mn-ea"/>
+        <a:cs typeface="+mn-cs"/>
+      </a:defRPr>
+    </a:lvl4pPr>
+    <a:lvl5pPr marL="1828800" algn="l" defTabSz="914400" rtl="0" eaLnBrk="1" latinLnBrk="0" hangingPunct="1">
+      <a:defRPr sz="1200" kern="1200">
+        <a:solidFill>
+          <a:schemeClr val="tx1"/>
+        </a:solidFill>
+        <a:latin typeface="+mn-lt"/>
+        <a:ea typeface="+mn-ea"/>
+        <a:cs typeface="+mn-cs"/>
+      </a:defRPr>
+    </a:lvl5pPr>
+    <a:lvl6pPr marL="2286000" algn="l" defTabSz="914400" rtl="0" eaLnBrk="1" latinLnBrk="0" hangingPunct="1">
+      <a:defRPr sz="1200" kern="1200">
+        <a:solidFill>
+          <a:schemeClr val="tx1"/>
+        </a:solidFill>
+        <a:latin typeface="+mn-lt"/>
+        <a:ea typeface="+mn-ea"/>
+        <a:cs typeface="+mn-cs"/>
+      </a:defRPr>
+    </a:lvl6pPr>
+    <a:lvl7pPr marL="2743200" algn="l" defTabSz="914400" rtl="0" eaLnBrk="1" latinLnBrk="0" hangingPunct="1">
+      <a:defRPr sz="1200" kern="1200">
+        <a:solidFill>
+          <a:schemeClr val="tx1"/>
+        </a:solidFill>
+        <a:latin typeface="+mn-lt"/>
+        <a:ea typeface="+mn-ea"/>
+        <a:cs typeface="+mn-cs"/>
+      </a:defRPr>
+    </a:lvl7pPr>
+    <a:lvl8pPr marL="3200400" algn="l" defTabSz="914400" rtl="0" eaLnBrk="1" latinLnBrk="0" hangingPunct="1">
+      <a:defRPr sz="1200" kern="1200">
+        <a:solidFill>
+          <a:schemeClr val="tx1"/>
+        </a:solidFill>
+        <a:latin typeface="+mn-lt"/>
+        <a:ea typeface="+mn-ea"/>
+        <a:cs typeface="+mn-cs"/>
+      </a:defRPr>
+    </a:lvl8pPr>
+    <a:lvl9pPr marL="3657600" algn="l" defTabSz="914400" rtl="0" eaLnBrk="1" latinLnBrk="0" hangingPunct="1">
+      <a:defRPr sz="1200" kern="1200">
+        <a:solidFill>
+          <a:schemeClr val="tx1"/>
+        </a:solidFill>
+        <a:latin typeface="+mn-lt"/>
+        <a:ea typeface="+mn-ea"/>
+        <a:cs typeface="+mn-cs"/>
+      </a:defRPr>
+    </a:lvl9pPr>
+  </p:notesStyle>
+</p:notesMaster>
+</file>
+
+<file path=ppt/notesSlides/notesSlide1.xml><?xml version="1.0" encoding="utf-8"?>
+<p:notes xmlns:a="http://schemas.openxmlformats.org/drawingml/2006/main" xmlns:r="http://schemas.openxmlformats.org/officeDocument/2006/relationships" xmlns:p="http://schemas.openxmlformats.org/presentationml/2006/main">
+  <p:cSld>
+    <p:spTree>
+      <p:nvGrpSpPr>
+        <p:cNvPr id="1" name=""/>
+        <p:cNvGrpSpPr/>
+        <p:nvPr/>
+      </p:nvGrpSpPr>
+      <p:grpSpPr>
+        <a:xfrm>
+          <a:off x="0" y="0"/>
+          <a:ext cx="0" cy="0"/>
+          <a:chOff x="0" y="0"/>
+          <a:chExt cx="0" cy="0"/>
+        </a:xfrm>
+      </p:grpSpPr>
+      <p:sp>
+        <p:nvSpPr>
+          <p:cNvPr id="2" name="Slide Image Placeholder 1"/>
+          <p:cNvSpPr>
+            <a:spLocks noGrp="1" noRot="1" noChangeAspect="1"/>
+          </p:cNvSpPr>
+          <p:nvPr>
+            <p:ph type="sldImg"/>
+          </p:nvPr>
+        </p:nvSpPr>
+        <p:spPr/>
+      </p:sp>
+      <p:sp>
+        <p:nvSpPr>
+          <p:cNvPr id="3" name="Notes Placeholder 2"/>
+          <p:cNvSpPr>
+            <a:spLocks noGrp="1"/>
+          </p:cNvSpPr>
+          <p:nvPr>
+            <p:ph type="body" idx="1"/>
+          </p:nvPr>
+        </p:nvSpPr>
+        <p:spPr/>
+        <p:txBody>
+          <a:bodyPr/>
+          <a:lstStyle/>
+          <a:p>
+            <a:endParaRPr lang="en-US"/>
+          </a:p>
+        </p:txBody>
+      </p:sp>
+      <p:sp>
+        <p:nvSpPr>
+          <p:cNvPr id="4" name="Slide Number Placeholder 3"/>
+          <p:cNvSpPr>
+            <a:spLocks noGrp="1"/>
+          </p:cNvSpPr>
+          <p:nvPr>
+            <p:ph type="sldNum" sz="quarter" idx="10"/>
+          </p:nvPr>
+        </p:nvSpPr>
+        <p:spPr/>
+        <p:txBody>
+          <a:bodyPr/>
+          <a:lstStyle/>
+          <a:p>
+            <a:fld id="{50A2EBFE-C82A-44FE-AF36-DE5CD2501462}" type="slidenum">
+              <a:rPr lang="en-US" smtClean="0"/>
+              <a:t>1</a:t>
+            </a:fld>
+            <a:endParaRPr lang="en-US"/>
+          </a:p>
+        </p:txBody>
+      </p:sp>
+    </p:spTree>
+    <p:extLst>
+      <p:ext uri="{BB962C8B-B14F-4D97-AF65-F5344CB8AC3E}">
+        <p14:creationId xmlns:p14="http://schemas.microsoft.com/office/powerpoint/2010/main" val="2390716963"/>
+      </p:ext>
+    </p:extLst>
+  </p:cSld>
+  <p:clrMapOvr>
+    <a:masterClrMapping/>
+  </p:clrMapOvr>
+</p:notes>
+</file>
+
 <file path=ppt/slideLayouts/slideLayout1.xml><?xml version="1.0" encoding="utf-8"?>
 <p:sldLayout xmlns:a="http://schemas.openxmlformats.org/drawingml/2006/main" xmlns:r="http://schemas.openxmlformats.org/officeDocument/2006/relationships" xmlns:p="http://schemas.openxmlformats.org/presentationml/2006/main" showMasterSp="0" type="title" preserve="1">
   <p:cSld name="Title Slide">
@@ -3948,7 +4383,7 @@
           <a:bodyPr/>
           <a:lstStyle/>
           <a:p>
-            <a:fld id="{32A8F5E4-648A-448B-9C2A-CAF7120A42F2}" type="datetimeFigureOut">
+            <a:fld id="{2369A917-610C-43DE-8459-4C78C79892C6}" type="datetime1">
               <a:rPr lang="en-US" smtClean="0"/>
               <a:t>5/3/2015</a:t>
             </a:fld>
@@ -4046,13 +4481,13 @@
   <p:clrMapOvr>
     <a:masterClrMapping/>
   </p:clrMapOvr>
-  <mc:AlternateContent xmlns:mc="http://schemas.openxmlformats.org/markup-compatibility/2006">
-    <mc:Choice xmlns:p14="http://schemas.microsoft.com/office/powerpoint/2010/main" Requires="p14">
+  <mc:AlternateContent xmlns:mc="http://schemas.openxmlformats.org/markup-compatibility/2006" xmlns:p14="http://schemas.microsoft.com/office/powerpoint/2010/main">
+    <mc:Choice Requires="p14">
       <p:transition p14:dur="100">
         <p:cut/>
       </p:transition>
     </mc:Choice>
-    <mc:Fallback>
+    <mc:Fallback xmlns="">
       <p:transition>
         <p:cut/>
       </p:transition>
@@ -4175,7 +4610,7 @@
           <a:bodyPr/>
           <a:lstStyle/>
           <a:p>
-            <a:fld id="{32A8F5E4-648A-448B-9C2A-CAF7120A42F2}" type="datetimeFigureOut">
+            <a:fld id="{CC6E5D84-1F97-4480-8BAB-C285329ED842}" type="datetime1">
               <a:rPr lang="en-US" smtClean="0"/>
               <a:t>5/3/2015</a:t>
             </a:fld>
@@ -4235,13 +4670,13 @@
   <p:clrMapOvr>
     <a:masterClrMapping/>
   </p:clrMapOvr>
-  <mc:AlternateContent xmlns:mc="http://schemas.openxmlformats.org/markup-compatibility/2006">
-    <mc:Choice xmlns:p14="http://schemas.microsoft.com/office/powerpoint/2010/main" Requires="p14">
+  <mc:AlternateContent xmlns:mc="http://schemas.openxmlformats.org/markup-compatibility/2006" xmlns:p14="http://schemas.microsoft.com/office/powerpoint/2010/main">
+    <mc:Choice Requires="p14">
       <p:transition p14:dur="100">
         <p:cut/>
       </p:transition>
     </mc:Choice>
-    <mc:Fallback>
+    <mc:Fallback xmlns="">
       <p:transition>
         <p:cut/>
       </p:transition>
@@ -4450,7 +4885,7 @@
           <a:bodyPr/>
           <a:lstStyle/>
           <a:p>
-            <a:fld id="{32A8F5E4-648A-448B-9C2A-CAF7120A42F2}" type="datetimeFigureOut">
+            <a:fld id="{E8273123-2FF4-4514-95F8-8A874858720C}" type="datetime1">
               <a:rPr lang="en-US" smtClean="0"/>
               <a:t>5/3/2015</a:t>
             </a:fld>
@@ -4510,13 +4945,13 @@
   <p:clrMapOvr>
     <a:masterClrMapping/>
   </p:clrMapOvr>
-  <mc:AlternateContent xmlns:mc="http://schemas.openxmlformats.org/markup-compatibility/2006">
-    <mc:Choice xmlns:p14="http://schemas.microsoft.com/office/powerpoint/2010/main" Requires="p14">
+  <mc:AlternateContent xmlns:mc="http://schemas.openxmlformats.org/markup-compatibility/2006" xmlns:p14="http://schemas.microsoft.com/office/powerpoint/2010/main">
+    <mc:Choice Requires="p14">
       <p:transition p14:dur="100">
         <p:cut/>
       </p:transition>
     </mc:Choice>
-    <mc:Fallback>
+    <mc:Fallback xmlns="">
       <p:transition>
         <p:cut/>
       </p:transition>
@@ -4639,7 +5074,7 @@
           <a:bodyPr/>
           <a:lstStyle/>
           <a:p>
-            <a:fld id="{32A8F5E4-648A-448B-9C2A-CAF7120A42F2}" type="datetimeFigureOut">
+            <a:fld id="{223BAE2D-B438-4F95-9DFF-30420CF12FAF}" type="datetime1">
               <a:rPr lang="en-US" smtClean="0"/>
               <a:t>5/3/2015</a:t>
             </a:fld>
@@ -4699,13 +5134,13 @@
   <p:clrMapOvr>
     <a:masterClrMapping/>
   </p:clrMapOvr>
-  <mc:AlternateContent xmlns:mc="http://schemas.openxmlformats.org/markup-compatibility/2006">
-    <mc:Choice xmlns:p14="http://schemas.microsoft.com/office/powerpoint/2010/main" Requires="p14">
+  <mc:AlternateContent xmlns:mc="http://schemas.openxmlformats.org/markup-compatibility/2006" xmlns:p14="http://schemas.microsoft.com/office/powerpoint/2010/main">
+    <mc:Choice Requires="p14">
       <p:transition p14:dur="100">
         <p:cut/>
       </p:transition>
     </mc:Choice>
-    <mc:Fallback>
+    <mc:Fallback xmlns="">
       <p:transition>
         <p:cut/>
       </p:transition>
@@ -5001,7 +5436,7 @@
           <a:bodyPr/>
           <a:lstStyle/>
           <a:p>
-            <a:fld id="{32A8F5E4-648A-448B-9C2A-CAF7120A42F2}" type="datetimeFigureOut">
+            <a:fld id="{A635F6F7-3570-42CE-93E1-3CF3E383AF0E}" type="datetime1">
               <a:rPr lang="en-US" smtClean="0"/>
               <a:t>5/3/2015</a:t>
             </a:fld>
@@ -5099,13 +5534,13 @@
   <p:clrMapOvr>
     <a:masterClrMapping/>
   </p:clrMapOvr>
-  <mc:AlternateContent xmlns:mc="http://schemas.openxmlformats.org/markup-compatibility/2006">
-    <mc:Choice xmlns:p14="http://schemas.microsoft.com/office/powerpoint/2010/main" Requires="p14">
+  <mc:AlternateContent xmlns:mc="http://schemas.openxmlformats.org/markup-compatibility/2006" xmlns:p14="http://schemas.microsoft.com/office/powerpoint/2010/main">
+    <mc:Choice Requires="p14">
       <p:transition p14:dur="100">
         <p:cut/>
       </p:transition>
     </mc:Choice>
-    <mc:Fallback>
+    <mc:Fallback xmlns="">
       <p:transition>
         <p:cut/>
       </p:transition>
@@ -5295,7 +5730,7 @@
           <a:bodyPr/>
           <a:lstStyle/>
           <a:p>
-            <a:fld id="{32A8F5E4-648A-448B-9C2A-CAF7120A42F2}" type="datetimeFigureOut">
+            <a:fld id="{18E8A310-28DB-498B-86D5-AD2D5F9BA428}" type="datetime1">
               <a:rPr lang="en-US" smtClean="0"/>
               <a:t>5/3/2015</a:t>
             </a:fld>
@@ -5355,13 +5790,13 @@
   <p:clrMapOvr>
     <a:masterClrMapping/>
   </p:clrMapOvr>
-  <mc:AlternateContent xmlns:mc="http://schemas.openxmlformats.org/markup-compatibility/2006">
-    <mc:Choice xmlns:p14="http://schemas.microsoft.com/office/powerpoint/2010/main" Requires="p14">
+  <mc:AlternateContent xmlns:mc="http://schemas.openxmlformats.org/markup-compatibility/2006" xmlns:p14="http://schemas.microsoft.com/office/powerpoint/2010/main">
+    <mc:Choice Requires="p14">
       <p:transition p14:dur="100">
         <p:cut/>
       </p:transition>
     </mc:Choice>
-    <mc:Fallback>
+    <mc:Fallback xmlns="">
       <p:transition>
         <p:cut/>
       </p:transition>
@@ -5693,7 +6128,7 @@
           <a:bodyPr/>
           <a:lstStyle/>
           <a:p>
-            <a:fld id="{32A8F5E4-648A-448B-9C2A-CAF7120A42F2}" type="datetimeFigureOut">
+            <a:fld id="{4F3F0C05-C3D0-4EF3-B46D-92E0CDB0CBE8}" type="datetime1">
               <a:rPr lang="en-US" smtClean="0"/>
               <a:t>5/3/2015</a:t>
             </a:fld>
@@ -5753,13 +6188,13 @@
   <p:clrMapOvr>
     <a:masterClrMapping/>
   </p:clrMapOvr>
-  <mc:AlternateContent xmlns:mc="http://schemas.openxmlformats.org/markup-compatibility/2006">
-    <mc:Choice xmlns:p14="http://schemas.microsoft.com/office/powerpoint/2010/main" Requires="p14">
+  <mc:AlternateContent xmlns:mc="http://schemas.openxmlformats.org/markup-compatibility/2006" xmlns:p14="http://schemas.microsoft.com/office/powerpoint/2010/main">
+    <mc:Choice Requires="p14">
       <p:transition p14:dur="100">
         <p:cut/>
       </p:transition>
     </mc:Choice>
-    <mc:Fallback>
+    <mc:Fallback xmlns="">
       <p:transition>
         <p:cut/>
       </p:transition>
@@ -5830,7 +6265,7 @@
           <a:bodyPr/>
           <a:lstStyle/>
           <a:p>
-            <a:fld id="{32A8F5E4-648A-448B-9C2A-CAF7120A42F2}" type="datetimeFigureOut">
+            <a:fld id="{DEF5724D-725F-4A95-8B39-19453D2C0299}" type="datetime1">
               <a:rPr lang="en-US" smtClean="0"/>
               <a:t>5/3/2015</a:t>
             </a:fld>
@@ -5890,13 +6325,13 @@
   <p:clrMapOvr>
     <a:masterClrMapping/>
   </p:clrMapOvr>
-  <mc:AlternateContent xmlns:mc="http://schemas.openxmlformats.org/markup-compatibility/2006">
-    <mc:Choice xmlns:p14="http://schemas.microsoft.com/office/powerpoint/2010/main" Requires="p14">
+  <mc:AlternateContent xmlns:mc="http://schemas.openxmlformats.org/markup-compatibility/2006" xmlns:p14="http://schemas.microsoft.com/office/powerpoint/2010/main">
+    <mc:Choice Requires="p14">
       <p:transition p14:dur="100">
         <p:cut/>
       </p:transition>
     </mc:Choice>
-    <mc:Fallback>
+    <mc:Fallback xmlns="">
       <p:transition>
         <p:cut/>
       </p:transition>
@@ -6020,7 +6455,7 @@
           <a:bodyPr/>
           <a:lstStyle/>
           <a:p>
-            <a:fld id="{32A8F5E4-648A-448B-9C2A-CAF7120A42F2}" type="datetimeFigureOut">
+            <a:fld id="{3D8EAF8E-4E40-41AD-A5F8-62B4405F82C7}" type="datetime1">
               <a:rPr lang="en-US" smtClean="0"/>
               <a:t>5/3/2015</a:t>
             </a:fld>
@@ -6088,13 +6523,13 @@
   <p:clrMapOvr>
     <a:masterClrMapping/>
   </p:clrMapOvr>
-  <mc:AlternateContent xmlns:mc="http://schemas.openxmlformats.org/markup-compatibility/2006">
-    <mc:Choice xmlns:p14="http://schemas.microsoft.com/office/powerpoint/2010/main" Requires="p14">
+  <mc:AlternateContent xmlns:mc="http://schemas.openxmlformats.org/markup-compatibility/2006" xmlns:p14="http://schemas.microsoft.com/office/powerpoint/2010/main">
+    <mc:Choice Requires="p14">
       <p:transition p14:dur="100">
         <p:cut/>
       </p:transition>
     </mc:Choice>
-    <mc:Fallback>
+    <mc:Fallback xmlns="">
       <p:transition>
         <p:cut/>
       </p:transition>
@@ -6393,7 +6828,7 @@
             </a:lvl1pPr>
           </a:lstStyle>
           <a:p>
-            <a:fld id="{32A8F5E4-648A-448B-9C2A-CAF7120A42F2}" type="datetimeFigureOut">
+            <a:fld id="{7EA633A0-17C6-417F-B18D-DC75E6CC2503}" type="datetime1">
               <a:rPr lang="en-US" smtClean="0"/>
               <a:t>5/3/2015</a:t>
             </a:fld>
@@ -6474,13 +6909,13 @@
   <p:clrMapOvr>
     <a:masterClrMapping/>
   </p:clrMapOvr>
-  <mc:AlternateContent xmlns:mc="http://schemas.openxmlformats.org/markup-compatibility/2006">
-    <mc:Choice xmlns:p14="http://schemas.microsoft.com/office/powerpoint/2010/main" Requires="p14">
+  <mc:AlternateContent xmlns:mc="http://schemas.openxmlformats.org/markup-compatibility/2006" xmlns:p14="http://schemas.microsoft.com/office/powerpoint/2010/main">
+    <mc:Choice Requires="p14">
       <p:transition p14:dur="100">
         <p:cut/>
       </p:transition>
     </mc:Choice>
-    <mc:Fallback>
+    <mc:Fallback xmlns="">
       <p:transition>
         <p:cut/>
       </p:transition>
@@ -6789,7 +7224,7 @@
           <a:bodyPr/>
           <a:lstStyle/>
           <a:p>
-            <a:fld id="{32A8F5E4-648A-448B-9C2A-CAF7120A42F2}" type="datetimeFigureOut">
+            <a:fld id="{CDF4B210-249A-4CA8-B707-FC593CA6B553}" type="datetime1">
               <a:rPr lang="en-US" smtClean="0"/>
               <a:t>5/3/2015</a:t>
             </a:fld>
@@ -6849,13 +7284,13 @@
   <p:clrMapOvr>
     <a:masterClrMapping/>
   </p:clrMapOvr>
-  <mc:AlternateContent xmlns:mc="http://schemas.openxmlformats.org/markup-compatibility/2006">
-    <mc:Choice xmlns:p14="http://schemas.microsoft.com/office/powerpoint/2010/main" Requires="p14">
+  <mc:AlternateContent xmlns:mc="http://schemas.openxmlformats.org/markup-compatibility/2006" xmlns:p14="http://schemas.microsoft.com/office/powerpoint/2010/main">
+    <mc:Choice Requires="p14">
       <p:transition p14:dur="100">
         <p:cut/>
       </p:transition>
     </mc:Choice>
-    <mc:Fallback>
+    <mc:Fallback xmlns="">
       <p:transition>
         <p:cut/>
       </p:transition>
@@ -7095,7 +7530,7 @@
             </a:lvl1pPr>
           </a:lstStyle>
           <a:p>
-            <a:fld id="{32A8F5E4-648A-448B-9C2A-CAF7120A42F2}" type="datetimeFigureOut">
+            <a:fld id="{E63A3F7A-25EB-41B1-A88D-24897039B9E7}" type="datetime1">
               <a:rPr lang="en-US" smtClean="0"/>
               <a:t>5/3/2015</a:t>
             </a:fld>
@@ -7236,13 +7671,13 @@
     <p:sldLayoutId id="2147483874" r:id="rId10"/>
     <p:sldLayoutId id="2147483875" r:id="rId11"/>
   </p:sldLayoutIdLst>
-  <mc:AlternateContent xmlns:mc="http://schemas.openxmlformats.org/markup-compatibility/2006">
-    <mc:Choice xmlns:p14="http://schemas.microsoft.com/office/powerpoint/2010/main" Requires="p14">
+  <mc:AlternateContent xmlns:mc="http://schemas.openxmlformats.org/markup-compatibility/2006" xmlns:p14="http://schemas.microsoft.com/office/powerpoint/2010/main">
+    <mc:Choice Requires="p14">
       <p:transition p14:dur="100">
         <p:cut/>
       </p:transition>
     </mc:Choice>
-    <mc:Fallback>
+    <mc:Fallback xmlns="">
       <p:transition>
         <p:cut/>
       </p:transition>
@@ -7255,6 +7690,7 @@
       </p:par>
     </p:tnLst>
   </p:timing>
+  <p:hf hdr="0" ftr="0" dt="0"/>
   <p:txStyles>
     <p:titleStyle>
       <a:lvl1pPr algn="l" defTabSz="914400" rtl="0" eaLnBrk="1" latinLnBrk="0" hangingPunct="1">
@@ -7675,14 +8111,80 @@
         </p:nvSpPr>
         <p:spPr/>
         <p:txBody>
+          <a:bodyPr>
+            <a:normAutofit fontScale="62500" lnSpcReduction="20000"/>
+          </a:bodyPr>
+          <a:lstStyle/>
+          <a:p>
+            <a:r>
+              <a:rPr lang="en-US" sz="3200" dirty="0" smtClean="0"/>
+              <a:t>Capture the moments that make you </a:t>
+            </a:r>
+            <a:r>
+              <a:rPr lang="en-US" sz="3200" dirty="0" smtClean="0"/>
+              <a:t>happiest</a:t>
+            </a:r>
+          </a:p>
+          <a:p>
+            <a:endParaRPr lang="en-US" sz="3200" dirty="0"/>
+          </a:p>
+          <a:p>
+            <a:r>
+              <a:rPr lang="en-US" sz="3200" dirty="0" smtClean="0"/>
+              <a:t>Marie Huynh, Nick Fotopoulos, </a:t>
+            </a:r>
+            <a:r>
+              <a:rPr lang="en-US" sz="3200" dirty="0" err="1" smtClean="0"/>
+              <a:t>derek</a:t>
+            </a:r>
+            <a:r>
+              <a:rPr lang="en-US" sz="3200" dirty="0" smtClean="0"/>
+              <a:t> </a:t>
+            </a:r>
+            <a:r>
+              <a:rPr lang="en-US" sz="3200" dirty="0" err="1" smtClean="0"/>
+              <a:t>solven</a:t>
+            </a:r>
+            <a:r>
+              <a:rPr lang="en-US" sz="3200" dirty="0" smtClean="0"/>
+              <a:t>, </a:t>
+            </a:r>
+            <a:r>
+              <a:rPr lang="en-US" sz="3200" dirty="0" err="1" smtClean="0"/>
+              <a:t>joan</a:t>
+            </a:r>
+            <a:r>
+              <a:rPr lang="en-US" sz="3200" dirty="0" smtClean="0"/>
+              <a:t> </a:t>
+            </a:r>
+            <a:r>
+              <a:rPr lang="en-US" sz="3200" dirty="0" err="1" smtClean="0"/>
+              <a:t>solven</a:t>
+            </a:r>
+            <a:endParaRPr lang="en-US" sz="3200" dirty="0"/>
+          </a:p>
+        </p:txBody>
+      </p:sp>
+      <p:sp>
+        <p:nvSpPr>
+          <p:cNvPr id="4" name="Slide Number Placeholder 3"/>
+          <p:cNvSpPr>
+            <a:spLocks noGrp="1"/>
+          </p:cNvSpPr>
+          <p:nvPr>
+            <p:ph type="sldNum" sz="quarter" idx="12"/>
+          </p:nvPr>
+        </p:nvSpPr>
+        <p:spPr/>
+        <p:txBody>
           <a:bodyPr/>
           <a:lstStyle/>
           <a:p>
-            <a:r>
-              <a:rPr lang="en-US" dirty="0" smtClean="0"/>
-              <a:t>Capture the moments that make you happiest</a:t>
-            </a:r>
-            <a:endParaRPr lang="en-US" dirty="0"/>
+            <a:fld id="{7BBE7C6A-3F3E-4E4E-949C-17C60615056F}" type="slidenum">
+              <a:rPr lang="en-US" smtClean="0"/>
+              <a:t>1</a:t>
+            </a:fld>
+            <a:endParaRPr lang="en-US"/>
           </a:p>
         </p:txBody>
       </p:sp>
@@ -7696,11 +8198,11 @@
   <p:clrMapOvr>
     <a:masterClrMapping/>
   </p:clrMapOvr>
-  <mc:AlternateContent xmlns:mc="http://schemas.openxmlformats.org/markup-compatibility/2006">
-    <mc:Choice xmlns:p14="http://schemas.microsoft.com/office/powerpoint/2010/main" Requires="p14">
+  <mc:AlternateContent xmlns:mc="http://schemas.openxmlformats.org/markup-compatibility/2006" xmlns:p14="http://schemas.microsoft.com/office/powerpoint/2010/main">
+    <mc:Choice Requires="p14">
       <p:transition p14:dur="10"/>
     </mc:Choice>
-    <mc:Fallback>
+    <mc:Fallback xmlns="">
       <p:transition/>
     </mc:Fallback>
   </mc:AlternateContent>
@@ -7770,27 +8272,56 @@
           <a:lstStyle/>
           <a:p>
             <a:r>
-              <a:rPr lang="en-US" dirty="0" smtClean="0"/>
+              <a:rPr lang="en-US" sz="2800" dirty="0" smtClean="0">
+                <a:latin typeface="+mj-lt"/>
+              </a:rPr>
               <a:t>Capture all the best moments of your life</a:t>
             </a:r>
           </a:p>
           <a:p>
             <a:r>
-              <a:rPr lang="en-US" dirty="0" smtClean="0"/>
+              <a:rPr lang="en-US" sz="2800" dirty="0" smtClean="0">
+                <a:latin typeface="+mj-lt"/>
+              </a:rPr>
               <a:t>They can be fleeting and ephemeral or special everyday moments</a:t>
             </a:r>
           </a:p>
           <a:p>
             <a:r>
-              <a:rPr lang="en-US" dirty="0" smtClean="0"/>
+              <a:rPr lang="en-US" sz="2800" dirty="0" smtClean="0">
+                <a:latin typeface="+mj-lt"/>
+              </a:rPr>
               <a:t>Measure when you are happiest, take a picture of the moment and save it for posterity</a:t>
             </a:r>
           </a:p>
           <a:p>
-            <a:endParaRPr lang="en-US" dirty="0" smtClean="0"/>
+            <a:endParaRPr lang="en-US" sz="2800" dirty="0" smtClean="0"/>
           </a:p>
           <a:p>
             <a:endParaRPr lang="en-US" dirty="0"/>
+          </a:p>
+        </p:txBody>
+      </p:sp>
+      <p:sp>
+        <p:nvSpPr>
+          <p:cNvPr id="4" name="Slide Number Placeholder 3"/>
+          <p:cNvSpPr>
+            <a:spLocks noGrp="1"/>
+          </p:cNvSpPr>
+          <p:nvPr>
+            <p:ph type="sldNum" sz="quarter" idx="12"/>
+          </p:nvPr>
+        </p:nvSpPr>
+        <p:spPr/>
+        <p:txBody>
+          <a:bodyPr/>
+          <a:lstStyle/>
+          <a:p>
+            <a:fld id="{7BBE7C6A-3F3E-4E4E-949C-17C60615056F}" type="slidenum">
+              <a:rPr lang="en-US" smtClean="0"/>
+              <a:t>2</a:t>
+            </a:fld>
+            <a:endParaRPr lang="en-US"/>
           </a:p>
         </p:txBody>
       </p:sp>
@@ -7869,9 +8400,58 @@
         </p:nvSpPr>
         <p:spPr/>
         <p:txBody>
+          <a:bodyPr>
+            <a:normAutofit/>
+          </a:bodyPr>
+          <a:lstStyle/>
+          <a:p>
+            <a:r>
+              <a:rPr lang="en-US" sz="3200" dirty="0" smtClean="0"/>
+              <a:t>Smile </a:t>
+            </a:r>
+            <a:r>
+              <a:rPr lang="en-US" sz="3200" dirty="0" smtClean="0">
+                <a:sym typeface="Wingdings" panose="05000000000000000000" pitchFamily="2" charset="2"/>
+              </a:rPr>
+              <a:t></a:t>
+            </a:r>
+            <a:r>
+              <a:rPr lang="en-US" sz="3200" dirty="0" smtClean="0"/>
+              <a:t> Snapshot </a:t>
+            </a:r>
+            <a:r>
+              <a:rPr lang="en-US" sz="3200" dirty="0" smtClean="0">
+                <a:sym typeface="Wingdings" panose="05000000000000000000" pitchFamily="2" charset="2"/>
+              </a:rPr>
+              <a:t></a:t>
+            </a:r>
+            <a:r>
+              <a:rPr lang="en-US" sz="3200" dirty="0" smtClean="0"/>
+              <a:t> tweet!</a:t>
+            </a:r>
+            <a:endParaRPr lang="en-US" sz="3200" dirty="0"/>
+          </a:p>
+        </p:txBody>
+      </p:sp>
+      <p:sp>
+        <p:nvSpPr>
+          <p:cNvPr id="4" name="Slide Number Placeholder 3"/>
+          <p:cNvSpPr>
+            <a:spLocks noGrp="1"/>
+          </p:cNvSpPr>
+          <p:nvPr>
+            <p:ph type="sldNum" sz="quarter" idx="12"/>
+          </p:nvPr>
+        </p:nvSpPr>
+        <p:spPr/>
+        <p:txBody>
           <a:bodyPr/>
           <a:lstStyle/>
           <a:p>
+            <a:fld id="{7BBE7C6A-3F3E-4E4E-949C-17C60615056F}" type="slidenum">
+              <a:rPr lang="en-US" smtClean="0"/>
+              <a:t>3</a:t>
+            </a:fld>
             <a:endParaRPr lang="en-US"/>
           </a:p>
         </p:txBody>
@@ -7951,14 +8531,20 @@
         </p:nvSpPr>
         <p:spPr/>
         <p:txBody>
-          <a:bodyPr/>
+          <a:bodyPr>
+            <a:normAutofit/>
+          </a:bodyPr>
           <a:lstStyle/>
           <a:p>
             <a:r>
-              <a:rPr lang="en-US" dirty="0" smtClean="0"/>
+              <a:rPr lang="en-US" sz="2800" dirty="0" smtClean="0">
+                <a:latin typeface="+mj-lt"/>
+              </a:rPr>
               <a:t>Capture Laugh, Smile and Smirk data through the EMOTIV EPOC and calculate a happiness factor</a:t>
             </a:r>
-            <a:endParaRPr lang="en-US" dirty="0"/>
+            <a:endParaRPr lang="en-US" sz="2800" dirty="0">
+              <a:latin typeface="+mj-lt"/>
+            </a:endParaRPr>
           </a:p>
         </p:txBody>
       </p:sp>
@@ -8003,6 +8589,29 @@
           </a:extLst>
         </p:spPr>
       </p:pic>
+      <p:sp>
+        <p:nvSpPr>
+          <p:cNvPr id="3" name="Slide Number Placeholder 2"/>
+          <p:cNvSpPr>
+            <a:spLocks noGrp="1"/>
+          </p:cNvSpPr>
+          <p:nvPr>
+            <p:ph type="sldNum" sz="quarter" idx="12"/>
+          </p:nvPr>
+        </p:nvSpPr>
+        <p:spPr/>
+        <p:txBody>
+          <a:bodyPr/>
+          <a:lstStyle/>
+          <a:p>
+            <a:fld id="{7BBE7C6A-3F3E-4E4E-949C-17C60615056F}" type="slidenum">
+              <a:rPr lang="en-US" smtClean="0"/>
+              <a:t>4</a:t>
+            </a:fld>
+            <a:endParaRPr lang="en-US"/>
+          </a:p>
+        </p:txBody>
+      </p:sp>
     </p:spTree>
     <p:extLst>
       <p:ext uri="{BB962C8B-B14F-4D97-AF65-F5344CB8AC3E}">
@@ -8067,6 +8676,29 @@
           </a:graphicData>
         </a:graphic>
       </p:graphicFrame>
+      <p:sp>
+        <p:nvSpPr>
+          <p:cNvPr id="3" name="Slide Number Placeholder 2"/>
+          <p:cNvSpPr>
+            <a:spLocks noGrp="1"/>
+          </p:cNvSpPr>
+          <p:nvPr>
+            <p:ph type="sldNum" sz="quarter" idx="12"/>
+          </p:nvPr>
+        </p:nvSpPr>
+        <p:spPr/>
+        <p:txBody>
+          <a:bodyPr/>
+          <a:lstStyle/>
+          <a:p>
+            <a:fld id="{7BBE7C6A-3F3E-4E4E-949C-17C60615056F}" type="slidenum">
+              <a:rPr lang="en-US" smtClean="0"/>
+              <a:t>5</a:t>
+            </a:fld>
+            <a:endParaRPr lang="en-US"/>
+          </a:p>
+        </p:txBody>
+      </p:sp>
     </p:spTree>
     <p:extLst>
       <p:ext uri="{BB962C8B-B14F-4D97-AF65-F5344CB8AC3E}">
@@ -8091,329 +8723,6 @@
 </file>
 
 <file path=ppt/slides/slide6.xml><?xml version="1.0" encoding="utf-8"?>
-<p:sld xmlns:a="http://schemas.openxmlformats.org/drawingml/2006/main" xmlns:r="http://schemas.openxmlformats.org/officeDocument/2006/relationships" xmlns:p="http://schemas.openxmlformats.org/presentationml/2006/main">
-  <p:cSld>
-    <p:spTree>
-      <p:nvGrpSpPr>
-        <p:cNvPr id="1" name=""/>
-        <p:cNvGrpSpPr/>
-        <p:nvPr/>
-      </p:nvGrpSpPr>
-      <p:grpSpPr>
-        <a:xfrm>
-          <a:off x="0" y="0"/>
-          <a:ext cx="0" cy="0"/>
-          <a:chOff x="0" y="0"/>
-          <a:chExt cx="0" cy="0"/>
-        </a:xfrm>
-      </p:grpSpPr>
-      <p:sp>
-        <p:nvSpPr>
-          <p:cNvPr id="2" name="Title 1"/>
-          <p:cNvSpPr>
-            <a:spLocks noGrp="1"/>
-          </p:cNvSpPr>
-          <p:nvPr>
-            <p:ph type="title"/>
-          </p:nvPr>
-        </p:nvSpPr>
-        <p:spPr/>
-        <p:txBody>
-          <a:bodyPr/>
-          <a:lstStyle/>
-          <a:p>
-            <a:r>
-              <a:rPr lang="en-US" dirty="0" smtClean="0"/>
-              <a:t>Capture</a:t>
-            </a:r>
-            <a:endParaRPr lang="en-US" dirty="0"/>
-          </a:p>
-        </p:txBody>
-      </p:sp>
-      <p:pic>
-        <p:nvPicPr>
-          <p:cNvPr id="2050" name="Picture 2" descr="http://iconshow.me/media/images/Mixed/line-icon/png/512/camera-512.png"/>
-          <p:cNvPicPr>
-            <a:picLocks noGrp="1" noChangeAspect="1" noChangeArrowheads="1"/>
-          </p:cNvPicPr>
-          <p:nvPr>
-            <p:ph idx="1"/>
-          </p:nvPr>
-        </p:nvPicPr>
-        <p:blipFill>
-          <a:blip r:embed="rId2">
-            <a:extLst>
-              <a:ext uri="{28A0092B-C50C-407E-A947-70E740481C1C}">
-                <a14:useLocalDpi xmlns:a14="http://schemas.microsoft.com/office/drawing/2010/main" val="0"/>
-              </a:ext>
-            </a:extLst>
-          </a:blip>
-          <a:stretch>
-            <a:fillRect/>
-          </a:stretch>
-        </p:blipFill>
-        <p:spPr bwMode="auto">
-          <a:xfrm>
-            <a:off x="4114800" y="1846263"/>
-            <a:ext cx="4022725" cy="4022725"/>
-          </a:xfrm>
-          <a:prstGeom prst="rect">
-            <a:avLst/>
-          </a:prstGeom>
-          <a:noFill/>
-          <a:extLst>
-            <a:ext uri="{909E8E84-426E-40DD-AFC4-6F175D3DCCD1}">
-              <a14:hiddenFill xmlns:a14="http://schemas.microsoft.com/office/drawing/2010/main">
-                <a:solidFill>
-                  <a:srgbClr val="FFFFFF"/>
-                </a:solidFill>
-              </a14:hiddenFill>
-            </a:ext>
-          </a:extLst>
-        </p:spPr>
-      </p:pic>
-    </p:spTree>
-    <p:extLst>
-      <p:ext uri="{BB962C8B-B14F-4D97-AF65-F5344CB8AC3E}">
-        <p14:creationId xmlns:p14="http://schemas.microsoft.com/office/powerpoint/2010/main" val="37571428"/>
-      </p:ext>
-    </p:extLst>
-  </p:cSld>
-  <p:clrMapOvr>
-    <a:masterClrMapping/>
-  </p:clrMapOvr>
-  <p:transition spd="slow">
-    <p:cover/>
-  </p:transition>
-  <p:timing>
-    <p:tnLst>
-      <p:par>
-        <p:cTn id="1" dur="indefinite" restart="never" nodeType="tmRoot"/>
-      </p:par>
-    </p:tnLst>
-  </p:timing>
-</p:sld>
-</file>
-
-<file path=ppt/slides/slide7.xml><?xml version="1.0" encoding="utf-8"?>
-<p:sld xmlns:a="http://schemas.openxmlformats.org/drawingml/2006/main" xmlns:r="http://schemas.openxmlformats.org/officeDocument/2006/relationships" xmlns:p="http://schemas.openxmlformats.org/presentationml/2006/main">
-  <p:cSld>
-    <p:spTree>
-      <p:nvGrpSpPr>
-        <p:cNvPr id="1" name=""/>
-        <p:cNvGrpSpPr/>
-        <p:nvPr/>
-      </p:nvGrpSpPr>
-      <p:grpSpPr>
-        <a:xfrm>
-          <a:off x="0" y="0"/>
-          <a:ext cx="0" cy="0"/>
-          <a:chOff x="0" y="0"/>
-          <a:chExt cx="0" cy="0"/>
-        </a:xfrm>
-      </p:grpSpPr>
-      <p:sp>
-        <p:nvSpPr>
-          <p:cNvPr id="2" name="Title 1"/>
-          <p:cNvSpPr>
-            <a:spLocks noGrp="1"/>
-          </p:cNvSpPr>
-          <p:nvPr>
-            <p:ph type="title"/>
-          </p:nvPr>
-        </p:nvSpPr>
-        <p:spPr/>
-        <p:txBody>
-          <a:bodyPr/>
-          <a:lstStyle/>
-          <a:p>
-            <a:r>
-              <a:rPr lang="en-US" dirty="0" smtClean="0"/>
-              <a:t>Share – #</a:t>
-            </a:r>
-            <a:r>
-              <a:rPr lang="en-US" dirty="0" err="1" smtClean="0"/>
-              <a:t>TakenWithASmile</a:t>
-            </a:r>
-            <a:endParaRPr lang="en-US" dirty="0"/>
-          </a:p>
-        </p:txBody>
-      </p:sp>
-      <p:pic>
-        <p:nvPicPr>
-          <p:cNvPr id="3074" name="Picture 2" descr="http://static1.squarespace.com/static/52ed830ee4b02ab844b5f126/t/53347da3e4b09fffc70d613a/1395948969105/twitter-logo-transparent-small.png"/>
-          <p:cNvPicPr>
-            <a:picLocks noGrp="1" noChangeAspect="1" noChangeArrowheads="1"/>
-          </p:cNvPicPr>
-          <p:nvPr>
-            <p:ph idx="1"/>
-          </p:nvPr>
-        </p:nvPicPr>
-        <p:blipFill>
-          <a:blip r:embed="rId2">
-            <a:extLst>
-              <a:ext uri="{28A0092B-C50C-407E-A947-70E740481C1C}">
-                <a14:useLocalDpi xmlns:a14="http://schemas.microsoft.com/office/drawing/2010/main" val="0"/>
-              </a:ext>
-            </a:extLst>
-          </a:blip>
-          <a:srcRect/>
-          <a:stretch>
-            <a:fillRect/>
-          </a:stretch>
-        </p:blipFill>
-        <p:spPr bwMode="auto">
-          <a:xfrm>
-            <a:off x="4436113" y="2127127"/>
-            <a:ext cx="3319774" cy="2603745"/>
-          </a:xfrm>
-          <a:prstGeom prst="rect">
-            <a:avLst/>
-          </a:prstGeom>
-          <a:noFill/>
-          <a:extLst>
-            <a:ext uri="{909E8E84-426E-40DD-AFC4-6F175D3DCCD1}">
-              <a14:hiddenFill xmlns:a14="http://schemas.microsoft.com/office/drawing/2010/main">
-                <a:solidFill>
-                  <a:srgbClr val="FFFFFF"/>
-                </a:solidFill>
-              </a14:hiddenFill>
-            </a:ext>
-          </a:extLst>
-        </p:spPr>
-      </p:pic>
-    </p:spTree>
-    <p:extLst>
-      <p:ext uri="{BB962C8B-B14F-4D97-AF65-F5344CB8AC3E}">
-        <p14:creationId xmlns:p14="http://schemas.microsoft.com/office/powerpoint/2010/main" val="2480439092"/>
-      </p:ext>
-    </p:extLst>
-  </p:cSld>
-  <p:clrMapOvr>
-    <a:masterClrMapping/>
-  </p:clrMapOvr>
-  <p:transition spd="slow">
-    <p:cover/>
-  </p:transition>
-  <p:timing>
-    <p:tnLst>
-      <p:par>
-        <p:cTn id="1" dur="indefinite" restart="never" nodeType="tmRoot"/>
-      </p:par>
-    </p:tnLst>
-  </p:timing>
-</p:sld>
-</file>
-
-<file path=ppt/slides/slide8.xml><?xml version="1.0" encoding="utf-8"?>
-<p:sld xmlns:a="http://schemas.openxmlformats.org/drawingml/2006/main" xmlns:r="http://schemas.openxmlformats.org/officeDocument/2006/relationships" xmlns:p="http://schemas.openxmlformats.org/presentationml/2006/main">
-  <p:cSld>
-    <p:spTree>
-      <p:nvGrpSpPr>
-        <p:cNvPr id="1" name=""/>
-        <p:cNvGrpSpPr/>
-        <p:nvPr/>
-      </p:nvGrpSpPr>
-      <p:grpSpPr>
-        <a:xfrm>
-          <a:off x="0" y="0"/>
-          <a:ext cx="0" cy="0"/>
-          <a:chOff x="0" y="0"/>
-          <a:chExt cx="0" cy="0"/>
-        </a:xfrm>
-      </p:grpSpPr>
-      <p:sp>
-        <p:nvSpPr>
-          <p:cNvPr id="2" name="Title 1"/>
-          <p:cNvSpPr>
-            <a:spLocks noGrp="1"/>
-          </p:cNvSpPr>
-          <p:nvPr>
-            <p:ph type="title"/>
-          </p:nvPr>
-        </p:nvSpPr>
-        <p:spPr/>
-        <p:txBody>
-          <a:bodyPr/>
-          <a:lstStyle/>
-          <a:p>
-            <a:r>
-              <a:rPr lang="en-US" dirty="0" smtClean="0"/>
-              <a:t>Impact/ The Future</a:t>
-            </a:r>
-            <a:endParaRPr lang="en-US" dirty="0"/>
-          </a:p>
-        </p:txBody>
-      </p:sp>
-      <p:sp>
-        <p:nvSpPr>
-          <p:cNvPr id="3" name="Content Placeholder 2"/>
-          <p:cNvSpPr>
-            <a:spLocks noGrp="1"/>
-          </p:cNvSpPr>
-          <p:nvPr>
-            <p:ph idx="1"/>
-          </p:nvPr>
-        </p:nvSpPr>
-        <p:spPr/>
-        <p:txBody>
-          <a:bodyPr/>
-          <a:lstStyle/>
-          <a:p>
-            <a:r>
-              <a:rPr lang="en-US" dirty="0" smtClean="0"/>
-              <a:t>Enhance Happiness metric to include Engagement, Excitement and Valence data</a:t>
-            </a:r>
-          </a:p>
-          <a:p>
-            <a:r>
-              <a:rPr lang="en-US" dirty="0" smtClean="0"/>
-              <a:t>Develop an app and use the camera on your phone or your GoPro</a:t>
-            </a:r>
-          </a:p>
-          <a:p>
-            <a:r>
-              <a:rPr lang="en-US" dirty="0" smtClean="0"/>
-              <a:t>Interface with wearable headsets like the next gen </a:t>
-            </a:r>
-            <a:r>
-              <a:rPr lang="en-US" dirty="0" err="1" smtClean="0"/>
-              <a:t>Emotiv</a:t>
-            </a:r>
-            <a:r>
-              <a:rPr lang="en-US" dirty="0" smtClean="0"/>
-              <a:t> Insight</a:t>
-            </a:r>
-          </a:p>
-          <a:p>
-            <a:endParaRPr lang="en-US" dirty="0"/>
-          </a:p>
-        </p:txBody>
-      </p:sp>
-    </p:spTree>
-    <p:extLst>
-      <p:ext uri="{BB962C8B-B14F-4D97-AF65-F5344CB8AC3E}">
-        <p14:creationId xmlns:p14="http://schemas.microsoft.com/office/powerpoint/2010/main" val="2407033254"/>
-      </p:ext>
-    </p:extLst>
-  </p:cSld>
-  <p:clrMapOvr>
-    <a:masterClrMapping/>
-  </p:clrMapOvr>
-  <p:transition spd="slow">
-    <p:cover/>
-  </p:transition>
-  <p:timing>
-    <p:tnLst>
-      <p:par>
-        <p:cTn id="1" dur="indefinite" restart="never" nodeType="tmRoot"/>
-      </p:par>
-    </p:tnLst>
-  </p:timing>
-</p:sld>
-</file>
-
-<file path=ppt/slides/slide9.xml><?xml version="1.0" encoding="utf-8"?>
 <p:sld xmlns:a="http://schemas.openxmlformats.org/drawingml/2006/main" xmlns:r="http://schemas.openxmlformats.org/officeDocument/2006/relationships" xmlns:p="http://schemas.openxmlformats.org/presentationml/2006/main">
   <p:cSld>
     <p:spTree>
@@ -11570,6 +11879,29 @@
           </a:extLst>
         </p:spPr>
       </p:pic>
+      <p:sp>
+        <p:nvSpPr>
+          <p:cNvPr id="2" name="Slide Number Placeholder 1"/>
+          <p:cNvSpPr>
+            <a:spLocks noGrp="1"/>
+          </p:cNvSpPr>
+          <p:nvPr>
+            <p:ph type="sldNum" sz="quarter" idx="12"/>
+          </p:nvPr>
+        </p:nvSpPr>
+        <p:spPr/>
+        <p:txBody>
+          <a:bodyPr/>
+          <a:lstStyle/>
+          <a:p>
+            <a:fld id="{7BBE7C6A-3F3E-4E4E-949C-17C60615056F}" type="slidenum">
+              <a:rPr lang="en-US" smtClean="0"/>
+              <a:t>6</a:t>
+            </a:fld>
+            <a:endParaRPr lang="en-US"/>
+          </a:p>
+        </p:txBody>
+      </p:sp>
     </p:spTree>
     <p:extLst>
       <p:ext uri="{BB962C8B-B14F-4D97-AF65-F5344CB8AC3E}">
@@ -11583,6 +11915,138 @@
   <p:transition spd="slow">
     <p:cover/>
   </p:transition>
+  <p:timing>
+    <p:tnLst>
+      <p:par>
+        <p:cTn id="1" dur="indefinite" restart="never" nodeType="tmRoot"/>
+      </p:par>
+    </p:tnLst>
+  </p:timing>
+</p:sld>
+</file>
+
+<file path=ppt/slides/slide7.xml><?xml version="1.0" encoding="utf-8"?>
+<p:sld xmlns:a="http://schemas.openxmlformats.org/drawingml/2006/main" xmlns:r="http://schemas.openxmlformats.org/officeDocument/2006/relationships" xmlns:p="http://schemas.openxmlformats.org/presentationml/2006/main">
+  <p:cSld>
+    <p:spTree>
+      <p:nvGrpSpPr>
+        <p:cNvPr id="1" name=""/>
+        <p:cNvGrpSpPr/>
+        <p:nvPr/>
+      </p:nvGrpSpPr>
+      <p:grpSpPr>
+        <a:xfrm>
+          <a:off x="0" y="0"/>
+          <a:ext cx="0" cy="0"/>
+          <a:chOff x="0" y="0"/>
+          <a:chExt cx="0" cy="0"/>
+        </a:xfrm>
+      </p:grpSpPr>
+      <p:sp>
+        <p:nvSpPr>
+          <p:cNvPr id="2" name="Title 1"/>
+          <p:cNvSpPr>
+            <a:spLocks noGrp="1"/>
+          </p:cNvSpPr>
+          <p:nvPr>
+            <p:ph type="title"/>
+          </p:nvPr>
+        </p:nvSpPr>
+        <p:spPr/>
+        <p:txBody>
+          <a:bodyPr/>
+          <a:lstStyle/>
+          <a:p>
+            <a:r>
+              <a:rPr lang="en-US" dirty="0" smtClean="0"/>
+              <a:t>Thank you!</a:t>
+            </a:r>
+            <a:endParaRPr lang="en-US" dirty="0"/>
+          </a:p>
+        </p:txBody>
+      </p:sp>
+      <p:sp>
+        <p:nvSpPr>
+          <p:cNvPr id="3" name="Text Placeholder 2"/>
+          <p:cNvSpPr>
+            <a:spLocks noGrp="1"/>
+          </p:cNvSpPr>
+          <p:nvPr>
+            <p:ph type="body" idx="1"/>
+          </p:nvPr>
+        </p:nvSpPr>
+        <p:spPr/>
+        <p:txBody>
+          <a:bodyPr>
+            <a:normAutofit fontScale="85000" lnSpcReduction="20000"/>
+          </a:bodyPr>
+          <a:lstStyle/>
+          <a:p>
+            <a:r>
+              <a:rPr lang="en-US" dirty="0" smtClean="0"/>
+              <a:t>EMOTIV for lending us the headsets</a:t>
+            </a:r>
+          </a:p>
+          <a:p>
+            <a:r>
+              <a:rPr lang="en-US" dirty="0" smtClean="0"/>
+              <a:t>Pivotal for hosting</a:t>
+            </a:r>
+          </a:p>
+          <a:p>
+            <a:r>
+              <a:rPr lang="en-US" dirty="0" smtClean="0"/>
+              <a:t>all the sponsors and organizers for feeding us!</a:t>
+            </a:r>
+            <a:endParaRPr lang="en-US" dirty="0"/>
+          </a:p>
+        </p:txBody>
+      </p:sp>
+      <p:sp>
+        <p:nvSpPr>
+          <p:cNvPr id="4" name="Slide Number Placeholder 3"/>
+          <p:cNvSpPr>
+            <a:spLocks noGrp="1"/>
+          </p:cNvSpPr>
+          <p:nvPr>
+            <p:ph type="sldNum" sz="quarter" idx="12"/>
+          </p:nvPr>
+        </p:nvSpPr>
+        <p:spPr/>
+        <p:txBody>
+          <a:bodyPr/>
+          <a:lstStyle/>
+          <a:p>
+            <a:fld id="{7BBE7C6A-3F3E-4E4E-949C-17C60615056F}" type="slidenum">
+              <a:rPr lang="en-US" smtClean="0"/>
+              <a:t>7</a:t>
+            </a:fld>
+            <a:endParaRPr lang="en-US"/>
+          </a:p>
+        </p:txBody>
+      </p:sp>
+    </p:spTree>
+    <p:extLst>
+      <p:ext uri="{BB962C8B-B14F-4D97-AF65-F5344CB8AC3E}">
+        <p14:creationId xmlns:p14="http://schemas.microsoft.com/office/powerpoint/2010/main" val="554663629"/>
+      </p:ext>
+    </p:extLst>
+  </p:cSld>
+  <p:clrMapOvr>
+    <a:masterClrMapping/>
+  </p:clrMapOvr>
+  <mc:AlternateContent xmlns:mc="http://schemas.openxmlformats.org/markup-compatibility/2006">
+    <mc:Choice xmlns:p14="http://schemas.microsoft.com/office/powerpoint/2010/main" Requires="p14">
+      <p:transition p14:dur="100">
+        <p:cut/>
+      </p:transition>
+    </mc:Choice>
+    <mc:Fallback>
+      <p:transition>
+        <p:cut/>
+      </p:transition>
+    </mc:Fallback>
+  </mc:AlternateContent>
   <p:timing>
     <p:tnLst>
       <p:par>
@@ -11876,6 +12340,267 @@
 </a:theme>
 </file>
 
+<file path=ppt/theme/theme2.xml><?xml version="1.0" encoding="utf-8"?>
+<a:theme xmlns:a="http://schemas.openxmlformats.org/drawingml/2006/main" name="Office Theme">
+  <a:themeElements>
+    <a:clrScheme name="Office">
+      <a:dk1>
+        <a:sysClr val="windowText" lastClr="000000"/>
+      </a:dk1>
+      <a:lt1>
+        <a:sysClr val="window" lastClr="FFFFFF"/>
+      </a:lt1>
+      <a:dk2>
+        <a:srgbClr val="44546A"/>
+      </a:dk2>
+      <a:lt2>
+        <a:srgbClr val="E7E6E6"/>
+      </a:lt2>
+      <a:accent1>
+        <a:srgbClr val="5B9BD5"/>
+      </a:accent1>
+      <a:accent2>
+        <a:srgbClr val="ED7D31"/>
+      </a:accent2>
+      <a:accent3>
+        <a:srgbClr val="A5A5A5"/>
+      </a:accent3>
+      <a:accent4>
+        <a:srgbClr val="FFC000"/>
+      </a:accent4>
+      <a:accent5>
+        <a:srgbClr val="4472C4"/>
+      </a:accent5>
+      <a:accent6>
+        <a:srgbClr val="70AD47"/>
+      </a:accent6>
+      <a:hlink>
+        <a:srgbClr val="0563C1"/>
+      </a:hlink>
+      <a:folHlink>
+        <a:srgbClr val="954F72"/>
+      </a:folHlink>
+    </a:clrScheme>
+    <a:fontScheme name="Office">
+      <a:majorFont>
+        <a:latin typeface="Calibri Light" panose="020F0302020204030204"/>
+        <a:ea typeface=""/>
+        <a:cs typeface=""/>
+        <a:font script="Jpan" typeface="ＭＳ Ｐゴシック"/>
+        <a:font script="Hang" typeface="맑은 고딕"/>
+        <a:font script="Hans" typeface="宋体"/>
+        <a:font script="Hant" typeface="新細明體"/>
+        <a:font script="Arab" typeface="Times New Roman"/>
+        <a:font script="Hebr" typeface="Times New Roman"/>
+        <a:font script="Thai" typeface="Angsana New"/>
+        <a:font script="Ethi" typeface="Nyala"/>
+        <a:font script="Beng" typeface="Vrinda"/>
+        <a:font script="Gujr" typeface="Shruti"/>
+        <a:font script="Khmr" typeface="MoolBoran"/>
+        <a:font script="Knda" typeface="Tunga"/>
+        <a:font script="Guru" typeface="Raavi"/>
+        <a:font script="Cans" typeface="Euphemia"/>
+        <a:font script="Cher" typeface="Plantagenet Cherokee"/>
+        <a:font script="Yiii" typeface="Microsoft Yi Baiti"/>
+        <a:font script="Tibt" typeface="Microsoft Himalaya"/>
+        <a:font script="Thaa" typeface="MV Boli"/>
+        <a:font script="Deva" typeface="Mangal"/>
+        <a:font script="Telu" typeface="Gautami"/>
+        <a:font script="Taml" typeface="Latha"/>
+        <a:font script="Syrc" typeface="Estrangelo Edessa"/>
+        <a:font script="Orya" typeface="Kalinga"/>
+        <a:font script="Mlym" typeface="Kartika"/>
+        <a:font script="Laoo" typeface="DokChampa"/>
+        <a:font script="Sinh" typeface="Iskoola Pota"/>
+        <a:font script="Mong" typeface="Mongolian Baiti"/>
+        <a:font script="Viet" typeface="Times New Roman"/>
+        <a:font script="Uigh" typeface="Microsoft Uighur"/>
+        <a:font script="Geor" typeface="Sylfaen"/>
+      </a:majorFont>
+      <a:minorFont>
+        <a:latin typeface="Calibri" panose="020F0502020204030204"/>
+        <a:ea typeface=""/>
+        <a:cs typeface=""/>
+        <a:font script="Jpan" typeface="ＭＳ Ｐゴシック"/>
+        <a:font script="Hang" typeface="맑은 고딕"/>
+        <a:font script="Hans" typeface="宋体"/>
+        <a:font script="Hant" typeface="新細明體"/>
+        <a:font script="Arab" typeface="Arial"/>
+        <a:font script="Hebr" typeface="Arial"/>
+        <a:font script="Thai" typeface="Cordia New"/>
+        <a:font script="Ethi" typeface="Nyala"/>
+        <a:font script="Beng" typeface="Vrinda"/>
+        <a:font script="Gujr" typeface="Shruti"/>
+        <a:font script="Khmr" typeface="DaunPenh"/>
+        <a:font script="Knda" typeface="Tunga"/>
+        <a:font script="Guru" typeface="Raavi"/>
+        <a:font script="Cans" typeface="Euphemia"/>
+        <a:font script="Cher" typeface="Plantagenet Cherokee"/>
+        <a:font script="Yiii" typeface="Microsoft Yi Baiti"/>
+        <a:font script="Tibt" typeface="Microsoft Himalaya"/>
+        <a:font script="Thaa" typeface="MV Boli"/>
+        <a:font script="Deva" typeface="Mangal"/>
+        <a:font script="Telu" typeface="Gautami"/>
+        <a:font script="Taml" typeface="Latha"/>
+        <a:font script="Syrc" typeface="Estrangelo Edessa"/>
+        <a:font script="Orya" typeface="Kalinga"/>
+        <a:font script="Mlym" typeface="Kartika"/>
+        <a:font script="Laoo" typeface="DokChampa"/>
+        <a:font script="Sinh" typeface="Iskoola Pota"/>
+        <a:font script="Mong" typeface="Mongolian Baiti"/>
+        <a:font script="Viet" typeface="Arial"/>
+        <a:font script="Uigh" typeface="Microsoft Uighur"/>
+        <a:font script="Geor" typeface="Sylfaen"/>
+      </a:minorFont>
+    </a:fontScheme>
+    <a:fmtScheme name="Office">
+      <a:fillStyleLst>
+        <a:solidFill>
+          <a:schemeClr val="phClr"/>
+        </a:solidFill>
+        <a:gradFill rotWithShape="1">
+          <a:gsLst>
+            <a:gs pos="0">
+              <a:schemeClr val="phClr">
+                <a:lumMod val="110000"/>
+                <a:satMod val="105000"/>
+                <a:tint val="67000"/>
+              </a:schemeClr>
+            </a:gs>
+            <a:gs pos="50000">
+              <a:schemeClr val="phClr">
+                <a:lumMod val="105000"/>
+                <a:satMod val="103000"/>
+                <a:tint val="73000"/>
+              </a:schemeClr>
+            </a:gs>
+            <a:gs pos="100000">
+              <a:schemeClr val="phClr">
+                <a:lumMod val="105000"/>
+                <a:satMod val="109000"/>
+                <a:tint val="81000"/>
+              </a:schemeClr>
+            </a:gs>
+          </a:gsLst>
+          <a:lin ang="5400000" scaled="0"/>
+        </a:gradFill>
+        <a:gradFill rotWithShape="1">
+          <a:gsLst>
+            <a:gs pos="0">
+              <a:schemeClr val="phClr">
+                <a:satMod val="103000"/>
+                <a:lumMod val="102000"/>
+                <a:tint val="94000"/>
+              </a:schemeClr>
+            </a:gs>
+            <a:gs pos="50000">
+              <a:schemeClr val="phClr">
+                <a:satMod val="110000"/>
+                <a:lumMod val="100000"/>
+                <a:shade val="100000"/>
+              </a:schemeClr>
+            </a:gs>
+            <a:gs pos="100000">
+              <a:schemeClr val="phClr">
+                <a:lumMod val="99000"/>
+                <a:satMod val="120000"/>
+                <a:shade val="78000"/>
+              </a:schemeClr>
+            </a:gs>
+          </a:gsLst>
+          <a:lin ang="5400000" scaled="0"/>
+        </a:gradFill>
+      </a:fillStyleLst>
+      <a:lnStyleLst>
+        <a:ln w="6350" cap="flat" cmpd="sng" algn="ctr">
+          <a:solidFill>
+            <a:schemeClr val="phClr"/>
+          </a:solidFill>
+          <a:prstDash val="solid"/>
+          <a:miter lim="800000"/>
+        </a:ln>
+        <a:ln w="12700" cap="flat" cmpd="sng" algn="ctr">
+          <a:solidFill>
+            <a:schemeClr val="phClr"/>
+          </a:solidFill>
+          <a:prstDash val="solid"/>
+          <a:miter lim="800000"/>
+        </a:ln>
+        <a:ln w="19050" cap="flat" cmpd="sng" algn="ctr">
+          <a:solidFill>
+            <a:schemeClr val="phClr"/>
+          </a:solidFill>
+          <a:prstDash val="solid"/>
+          <a:miter lim="800000"/>
+        </a:ln>
+      </a:lnStyleLst>
+      <a:effectStyleLst>
+        <a:effectStyle>
+          <a:effectLst/>
+        </a:effectStyle>
+        <a:effectStyle>
+          <a:effectLst/>
+        </a:effectStyle>
+        <a:effectStyle>
+          <a:effectLst>
+            <a:outerShdw blurRad="57150" dist="19050" dir="5400000" algn="ctr" rotWithShape="0">
+              <a:srgbClr val="000000">
+                <a:alpha val="63000"/>
+              </a:srgbClr>
+            </a:outerShdw>
+          </a:effectLst>
+        </a:effectStyle>
+      </a:effectStyleLst>
+      <a:bgFillStyleLst>
+        <a:solidFill>
+          <a:schemeClr val="phClr"/>
+        </a:solidFill>
+        <a:solidFill>
+          <a:schemeClr val="phClr">
+            <a:tint val="95000"/>
+            <a:satMod val="170000"/>
+          </a:schemeClr>
+        </a:solidFill>
+        <a:gradFill rotWithShape="1">
+          <a:gsLst>
+            <a:gs pos="0">
+              <a:schemeClr val="phClr">
+                <a:tint val="93000"/>
+                <a:satMod val="150000"/>
+                <a:shade val="98000"/>
+                <a:lumMod val="102000"/>
+              </a:schemeClr>
+            </a:gs>
+            <a:gs pos="50000">
+              <a:schemeClr val="phClr">
+                <a:tint val="98000"/>
+                <a:satMod val="130000"/>
+                <a:shade val="90000"/>
+                <a:lumMod val="103000"/>
+              </a:schemeClr>
+            </a:gs>
+            <a:gs pos="100000">
+              <a:schemeClr val="phClr">
+                <a:shade val="63000"/>
+                <a:satMod val="120000"/>
+              </a:schemeClr>
+            </a:gs>
+          </a:gsLst>
+          <a:lin ang="5400000" scaled="0"/>
+        </a:gradFill>
+      </a:bgFillStyleLst>
+    </a:fmtScheme>
+  </a:themeElements>
+  <a:objectDefaults/>
+  <a:extraClrSchemeLst/>
+  <a:extLst>
+    <a:ext uri="{05A4C25C-085E-4340-85A3-A5531E510DB2}">
+      <thm15:themeFamily xmlns:thm15="http://schemas.microsoft.com/office/thememl/2012/main" name="Office Theme" id="{62F939B6-93AF-4DB8-9C6B-D6C7DFDC589F}" vid="{4A3C46E8-61CC-4603-A589-7422A47A8E4A}"/>
+    </a:ext>
+  </a:extLst>
+</a:theme>
+</file>
+
 <file path=ppt/theme/themeOverride1.xml><?xml version="1.0" encoding="utf-8"?>
 <a:themeOverride xmlns:a="http://schemas.openxmlformats.org/drawingml/2006/main">
   <a:clrScheme name="Office">

</xml_diff>